<commit_message>
Updated script to accomodate for multiple series
</commit_message>
<xml_diff>
--- a/PPT Master Template.pptx
+++ b/PPT Master Template.pptx
@@ -154,14 +154,6 @@
 </p:presentation>
 </file>
 
-<file path=ppt/revisionInfo.xml><?xml version="1.0" encoding="utf-8"?>
-<p1510:revInfo xmlns:a="http://schemas.openxmlformats.org/drawingml/2006/main" xmlns:r="http://schemas.openxmlformats.org/officeDocument/2006/relationships" xmlns:p1510="http://schemas.microsoft.com/office/powerpoint/2015/10/main">
-  <p1510:revLst>
-    <p1510:client id="{6DBACCA1-C247-4000-9758-17DA284A9E12}" v="14" dt="2025-09-02T08:14:14.338"/>
-  </p1510:revLst>
-</p1510:revInfo>
-</file>
-
 <file path=ppt/changesInfos/changesInfo1.xml><?xml version="1.0" encoding="utf-8"?>
 <pc:chgInfo xmlns:a="http://schemas.openxmlformats.org/drawingml/2006/main" xmlns:r="http://schemas.openxmlformats.org/officeDocument/2006/relationships" xmlns:ac="http://schemas.microsoft.com/office/drawing/2013/main/command" xmlns:pc="http://schemas.microsoft.com/office/powerpoint/2013/main/command">
   <pc:docChgLst>
@@ -177,38 +169,6 @@
           <pc:docMk/>
           <pc:sldMk cId="1440008154" sldId="826"/>
         </pc:sldMkLst>
-        <pc:spChg chg="mod">
-          <ac:chgData name="Meeaad Bharoochi" userId="5d99a4c0-c526-42b4-bcc3-23f4db4607c4" providerId="ADAL" clId="{6DBACCA1-C247-4000-9758-17DA284A9E12}" dt="2025-09-02T08:14:14.338" v="37"/>
-          <ac:spMkLst>
-            <pc:docMk/>
-            <pc:sldMk cId="1440008154" sldId="826"/>
-            <ac:spMk id="2" creationId="{153558F0-C0DF-4217-B081-446E09897AC7}"/>
-          </ac:spMkLst>
-        </pc:spChg>
-        <pc:spChg chg="mod">
-          <ac:chgData name="Meeaad Bharoochi" userId="5d99a4c0-c526-42b4-bcc3-23f4db4607c4" providerId="ADAL" clId="{6DBACCA1-C247-4000-9758-17DA284A9E12}" dt="2025-09-02T08:14:14.338" v="37"/>
-          <ac:spMkLst>
-            <pc:docMk/>
-            <pc:sldMk cId="1440008154" sldId="826"/>
-            <ac:spMk id="3" creationId="{78EAEE1B-A8BB-4CEC-8872-3726273589B5}"/>
-          </ac:spMkLst>
-        </pc:spChg>
-        <pc:spChg chg="mod">
-          <ac:chgData name="Meeaad Bharoochi" userId="5d99a4c0-c526-42b4-bcc3-23f4db4607c4" providerId="ADAL" clId="{6DBACCA1-C247-4000-9758-17DA284A9E12}" dt="2025-09-02T08:14:14.338" v="37"/>
-          <ac:spMkLst>
-            <pc:docMk/>
-            <pc:sldMk cId="1440008154" sldId="826"/>
-            <ac:spMk id="4" creationId="{3550AFD3-7AFD-4981-A237-305F41DA94A5}"/>
-          </ac:spMkLst>
-        </pc:spChg>
-        <pc:spChg chg="mod">
-          <ac:chgData name="Meeaad Bharoochi" userId="5d99a4c0-c526-42b4-bcc3-23f4db4607c4" providerId="ADAL" clId="{6DBACCA1-C247-4000-9758-17DA284A9E12}" dt="2025-09-02T08:14:14.338" v="37"/>
-          <ac:spMkLst>
-            <pc:docMk/>
-            <pc:sldMk cId="1440008154" sldId="826"/>
-            <ac:spMk id="5" creationId="{51EED8BB-A849-4C03-8D9C-A0598992E17A}"/>
-          </ac:spMkLst>
-        </pc:spChg>
       </pc:sldChg>
       <pc:sldChg chg="addSp delSp modSp mod chgLayout">
         <pc:chgData name="Meeaad Bharoochi" userId="5d99a4c0-c526-42b4-bcc3-23f4db4607c4" providerId="ADAL" clId="{6DBACCA1-C247-4000-9758-17DA284A9E12}" dt="2025-09-02T08:13:20.178" v="36" actId="6264"/>
@@ -216,118 +176,6 @@
           <pc:docMk/>
           <pc:sldMk cId="2493766527" sldId="828"/>
         </pc:sldMkLst>
-        <pc:spChg chg="del">
-          <ac:chgData name="Meeaad Bharoochi" userId="5d99a4c0-c526-42b4-bcc3-23f4db4607c4" providerId="ADAL" clId="{6DBACCA1-C247-4000-9758-17DA284A9E12}" dt="2025-09-02T07:54:16.147" v="21" actId="700"/>
-          <ac:spMkLst>
-            <pc:docMk/>
-            <pc:sldMk cId="2493766527" sldId="828"/>
-            <ac:spMk id="2" creationId="{1AC16DD3-CA08-415B-B89D-B8B9F56702DB}"/>
-          </ac:spMkLst>
-        </pc:spChg>
-        <pc:spChg chg="add del mod">
-          <ac:chgData name="Meeaad Bharoochi" userId="5d99a4c0-c526-42b4-bcc3-23f4db4607c4" providerId="ADAL" clId="{6DBACCA1-C247-4000-9758-17DA284A9E12}" dt="2025-09-02T08:13:20.178" v="36" actId="6264"/>
-          <ac:spMkLst>
-            <pc:docMk/>
-            <pc:sldMk cId="2493766527" sldId="828"/>
-            <ac:spMk id="2" creationId="{35D02141-E202-EE43-2693-A62B3E8C2772}"/>
-          </ac:spMkLst>
-        </pc:spChg>
-        <pc:spChg chg="del">
-          <ac:chgData name="Meeaad Bharoochi" userId="5d99a4c0-c526-42b4-bcc3-23f4db4607c4" providerId="ADAL" clId="{6DBACCA1-C247-4000-9758-17DA284A9E12}" dt="2025-09-02T07:54:16.147" v="21" actId="700"/>
-          <ac:spMkLst>
-            <pc:docMk/>
-            <pc:sldMk cId="2493766527" sldId="828"/>
-            <ac:spMk id="3" creationId="{1F1F6E61-B460-421E-B6EF-215E619E8971}"/>
-          </ac:spMkLst>
-        </pc:spChg>
-        <pc:spChg chg="add mod ord">
-          <ac:chgData name="Meeaad Bharoochi" userId="5d99a4c0-c526-42b4-bcc3-23f4db4607c4" providerId="ADAL" clId="{6DBACCA1-C247-4000-9758-17DA284A9E12}" dt="2025-09-02T08:13:20.178" v="36" actId="6264"/>
-          <ac:spMkLst>
-            <pc:docMk/>
-            <pc:sldMk cId="2493766527" sldId="828"/>
-            <ac:spMk id="3" creationId="{33D879DA-58AF-4B5C-2831-1B98963383B8}"/>
-          </ac:spMkLst>
-        </pc:spChg>
-        <pc:spChg chg="mod ord">
-          <ac:chgData name="Meeaad Bharoochi" userId="5d99a4c0-c526-42b4-bcc3-23f4db4607c4" providerId="ADAL" clId="{6DBACCA1-C247-4000-9758-17DA284A9E12}" dt="2025-09-02T08:13:20.178" v="36" actId="6264"/>
-          <ac:spMkLst>
-            <pc:docMk/>
-            <pc:sldMk cId="2493766527" sldId="828"/>
-            <ac:spMk id="4" creationId="{2437BFE9-872B-4EB1-BC31-33A59CB79AD0}"/>
-          </ac:spMkLst>
-        </pc:spChg>
-        <pc:spChg chg="add mod ord">
-          <ac:chgData name="Meeaad Bharoochi" userId="5d99a4c0-c526-42b4-bcc3-23f4db4607c4" providerId="ADAL" clId="{6DBACCA1-C247-4000-9758-17DA284A9E12}" dt="2025-09-02T08:13:20.178" v="36" actId="6264"/>
-          <ac:spMkLst>
-            <pc:docMk/>
-            <pc:sldMk cId="2493766527" sldId="828"/>
-            <ac:spMk id="5" creationId="{C1CD49FB-F108-D29F-B8E9-3FB8B2BBCEF0}"/>
-          </ac:spMkLst>
-        </pc:spChg>
-        <pc:spChg chg="del">
-          <ac:chgData name="Meeaad Bharoochi" userId="5d99a4c0-c526-42b4-bcc3-23f4db4607c4" providerId="ADAL" clId="{6DBACCA1-C247-4000-9758-17DA284A9E12}" dt="2025-09-02T07:54:16.147" v="21" actId="700"/>
-          <ac:spMkLst>
-            <pc:docMk/>
-            <pc:sldMk cId="2493766527" sldId="828"/>
-            <ac:spMk id="5" creationId="{F210CDB7-7AAF-4B13-9ACF-F06FB77B8587}"/>
-          </ac:spMkLst>
-        </pc:spChg>
-        <pc:spChg chg="add mod ord">
-          <ac:chgData name="Meeaad Bharoochi" userId="5d99a4c0-c526-42b4-bcc3-23f4db4607c4" providerId="ADAL" clId="{6DBACCA1-C247-4000-9758-17DA284A9E12}" dt="2025-09-02T08:13:20.178" v="36" actId="6264"/>
-          <ac:spMkLst>
-            <pc:docMk/>
-            <pc:sldMk cId="2493766527" sldId="828"/>
-            <ac:spMk id="6" creationId="{0986A7B9-A97F-5664-416C-DE98ACEDB9AF}"/>
-          </ac:spMkLst>
-        </pc:spChg>
-        <pc:spChg chg="add del mod ord">
-          <ac:chgData name="Meeaad Bharoochi" userId="5d99a4c0-c526-42b4-bcc3-23f4db4607c4" providerId="ADAL" clId="{6DBACCA1-C247-4000-9758-17DA284A9E12}" dt="2025-09-02T07:54:19.876" v="22" actId="700"/>
-          <ac:spMkLst>
-            <pc:docMk/>
-            <pc:sldMk cId="2493766527" sldId="828"/>
-            <ac:spMk id="6" creationId="{7A3FCF44-B570-D9A1-3046-1CA31C104877}"/>
-          </ac:spMkLst>
-        </pc:spChg>
-        <pc:spChg chg="add del mod ord">
-          <ac:chgData name="Meeaad Bharoochi" userId="5d99a4c0-c526-42b4-bcc3-23f4db4607c4" providerId="ADAL" clId="{6DBACCA1-C247-4000-9758-17DA284A9E12}" dt="2025-09-02T07:54:19.876" v="22" actId="700"/>
-          <ac:spMkLst>
-            <pc:docMk/>
-            <pc:sldMk cId="2493766527" sldId="828"/>
-            <ac:spMk id="7" creationId="{36338AA5-D166-D2C1-2CB4-8DC97F991AFE}"/>
-          </ac:spMkLst>
-        </pc:spChg>
-        <pc:spChg chg="add del mod ord">
-          <ac:chgData name="Meeaad Bharoochi" userId="5d99a4c0-c526-42b4-bcc3-23f4db4607c4" providerId="ADAL" clId="{6DBACCA1-C247-4000-9758-17DA284A9E12}" dt="2025-09-02T07:54:19.876" v="22" actId="700"/>
-          <ac:spMkLst>
-            <pc:docMk/>
-            <pc:sldMk cId="2493766527" sldId="828"/>
-            <ac:spMk id="8" creationId="{E0AC5916-1F25-77BE-F858-6F24C54B4BD2}"/>
-          </ac:spMkLst>
-        </pc:spChg>
-        <pc:spChg chg="add del mod ord">
-          <ac:chgData name="Meeaad Bharoochi" userId="5d99a4c0-c526-42b4-bcc3-23f4db4607c4" providerId="ADAL" clId="{6DBACCA1-C247-4000-9758-17DA284A9E12}" dt="2025-09-02T08:13:20.178" v="36" actId="6264"/>
-          <ac:spMkLst>
-            <pc:docMk/>
-            <pc:sldMk cId="2493766527" sldId="828"/>
-            <ac:spMk id="9" creationId="{0541BAAF-3CF4-F32B-98A8-3A16E3868E06}"/>
-          </ac:spMkLst>
-        </pc:spChg>
-        <pc:spChg chg="add del mod ord">
-          <ac:chgData name="Meeaad Bharoochi" userId="5d99a4c0-c526-42b4-bcc3-23f4db4607c4" providerId="ADAL" clId="{6DBACCA1-C247-4000-9758-17DA284A9E12}" dt="2025-09-02T08:13:20.178" v="36" actId="6264"/>
-          <ac:spMkLst>
-            <pc:docMk/>
-            <pc:sldMk cId="2493766527" sldId="828"/>
-            <ac:spMk id="10" creationId="{1879FCD2-33A1-6934-F516-99CACC5AC121}"/>
-          </ac:spMkLst>
-        </pc:spChg>
-        <pc:spChg chg="add del mod ord">
-          <ac:chgData name="Meeaad Bharoochi" userId="5d99a4c0-c526-42b4-bcc3-23f4db4607c4" providerId="ADAL" clId="{6DBACCA1-C247-4000-9758-17DA284A9E12}" dt="2025-09-02T08:13:20.178" v="36" actId="6264"/>
-          <ac:spMkLst>
-            <pc:docMk/>
-            <pc:sldMk cId="2493766527" sldId="828"/>
-            <ac:spMk id="11" creationId="{33492BE4-9E64-7F43-7A87-90930E896E27}"/>
-          </ac:spMkLst>
-        </pc:spChg>
       </pc:sldChg>
       <pc:sldChg chg="del">
         <pc:chgData name="Meeaad Bharoochi" userId="5d99a4c0-c526-42b4-bcc3-23f4db4607c4" providerId="ADAL" clId="{6DBACCA1-C247-4000-9758-17DA284A9E12}" dt="2025-09-01T13:08:38.068" v="0" actId="47"/>
@@ -342,14 +190,6 @@
           <pc:docMk/>
           <pc:sldMk cId="3317324773" sldId="829"/>
         </pc:sldMkLst>
-        <pc:spChg chg="mod">
-          <ac:chgData name="Meeaad Bharoochi" userId="5d99a4c0-c526-42b4-bcc3-23f4db4607c4" providerId="ADAL" clId="{6DBACCA1-C247-4000-9758-17DA284A9E12}" dt="2025-09-02T08:08:31.383" v="27" actId="20578"/>
-          <ac:spMkLst>
-            <pc:docMk/>
-            <pc:sldMk cId="3317324773" sldId="829"/>
-            <ac:spMk id="2" creationId="{5A6F27B9-89AE-CD31-53F1-4C35B7FD1E86}"/>
-          </ac:spMkLst>
-        </pc:spChg>
       </pc:sldChg>
       <pc:sldChg chg="del">
         <pc:chgData name="Meeaad Bharoochi" userId="5d99a4c0-c526-42b4-bcc3-23f4db4607c4" providerId="ADAL" clId="{6DBACCA1-C247-4000-9758-17DA284A9E12}" dt="2025-09-01T13:08:39.737" v="2" actId="47"/>
@@ -378,42 +218,6 @@
             <pc:sldMasterMk cId="408645214" sldId="2147483692"/>
             <pc:sldLayoutMk cId="1775546100" sldId="2147483694"/>
           </pc:sldLayoutMkLst>
-          <pc:spChg chg="mod">
-            <ac:chgData name="Meeaad Bharoochi" userId="5d99a4c0-c526-42b4-bcc3-23f4db4607c4" providerId="ADAL" clId="{6DBACCA1-C247-4000-9758-17DA284A9E12}" dt="2025-09-02T08:08:14.623" v="24" actId="20578"/>
-            <ac:spMkLst>
-              <pc:docMk/>
-              <pc:sldMasterMk cId="408645214" sldId="2147483692"/>
-              <pc:sldLayoutMk cId="1775546100" sldId="2147483694"/>
-              <ac:spMk id="2" creationId="{269CF024-CE78-C044-AC1C-749F5A01162F}"/>
-            </ac:spMkLst>
-          </pc:spChg>
-          <pc:spChg chg="mod">
-            <ac:chgData name="Meeaad Bharoochi" userId="5d99a4c0-c526-42b4-bcc3-23f4db4607c4" providerId="ADAL" clId="{6DBACCA1-C247-4000-9758-17DA284A9E12}" dt="2025-09-02T08:08:14.623" v="24" actId="20578"/>
-            <ac:spMkLst>
-              <pc:docMk/>
-              <pc:sldMasterMk cId="408645214" sldId="2147483692"/>
-              <pc:sldLayoutMk cId="1775546100" sldId="2147483694"/>
-              <ac:spMk id="3" creationId="{00E98E0F-C5DC-7746-96E8-3365A74A0FB3}"/>
-            </ac:spMkLst>
-          </pc:spChg>
-          <pc:spChg chg="mod">
-            <ac:chgData name="Meeaad Bharoochi" userId="5d99a4c0-c526-42b4-bcc3-23f4db4607c4" providerId="ADAL" clId="{6DBACCA1-C247-4000-9758-17DA284A9E12}" dt="2025-09-02T08:08:14.623" v="24" actId="20578"/>
-            <ac:spMkLst>
-              <pc:docMk/>
-              <pc:sldMasterMk cId="408645214" sldId="2147483692"/>
-              <pc:sldLayoutMk cId="1775546100" sldId="2147483694"/>
-              <ac:spMk id="8" creationId="{4892DD46-7CCA-E64B-85FF-CBF1C3886095}"/>
-            </ac:spMkLst>
-          </pc:spChg>
-          <pc:spChg chg="mod">
-            <ac:chgData name="Meeaad Bharoochi" userId="5d99a4c0-c526-42b4-bcc3-23f4db4607c4" providerId="ADAL" clId="{6DBACCA1-C247-4000-9758-17DA284A9E12}" dt="2025-09-02T08:08:14.623" v="24" actId="20578"/>
-            <ac:spMkLst>
-              <pc:docMk/>
-              <pc:sldMasterMk cId="408645214" sldId="2147483692"/>
-              <pc:sldLayoutMk cId="1775546100" sldId="2147483694"/>
-              <ac:spMk id="14" creationId="{3C72FCD4-32B2-F144-B95B-61FA8242A671}"/>
-            </ac:spMkLst>
-          </pc:spChg>
         </pc:sldLayoutChg>
         <pc:sldLayoutChg chg="modSp mod ord">
           <pc:chgData name="Meeaad Bharoochi" userId="5d99a4c0-c526-42b4-bcc3-23f4db4607c4" providerId="ADAL" clId="{6DBACCA1-C247-4000-9758-17DA284A9E12}" dt="2025-09-02T08:08:36.800" v="29" actId="20578"/>
@@ -422,42 +226,6 @@
             <pc:sldMasterMk cId="408645214" sldId="2147483692"/>
             <pc:sldLayoutMk cId="1806444034" sldId="2147483780"/>
           </pc:sldLayoutMkLst>
-          <pc:spChg chg="mod">
-            <ac:chgData name="Meeaad Bharoochi" userId="5d99a4c0-c526-42b4-bcc3-23f4db4607c4" providerId="ADAL" clId="{6DBACCA1-C247-4000-9758-17DA284A9E12}" dt="2025-09-02T08:08:36.800" v="29" actId="20578"/>
-            <ac:spMkLst>
-              <pc:docMk/>
-              <pc:sldMasterMk cId="408645214" sldId="2147483692"/>
-              <pc:sldLayoutMk cId="1806444034" sldId="2147483780"/>
-              <ac:spMk id="2" creationId="{269CF024-CE78-C044-AC1C-749F5A01162F}"/>
-            </ac:spMkLst>
-          </pc:spChg>
-          <pc:spChg chg="mod">
-            <ac:chgData name="Meeaad Bharoochi" userId="5d99a4c0-c526-42b4-bcc3-23f4db4607c4" providerId="ADAL" clId="{6DBACCA1-C247-4000-9758-17DA284A9E12}" dt="2025-09-02T08:08:36.800" v="29" actId="20578"/>
-            <ac:spMkLst>
-              <pc:docMk/>
-              <pc:sldMasterMk cId="408645214" sldId="2147483692"/>
-              <pc:sldLayoutMk cId="1806444034" sldId="2147483780"/>
-              <ac:spMk id="3" creationId="{00E98E0F-C5DC-7746-96E8-3365A74A0FB3}"/>
-            </ac:spMkLst>
-          </pc:spChg>
-          <pc:spChg chg="mod">
-            <ac:chgData name="Meeaad Bharoochi" userId="5d99a4c0-c526-42b4-bcc3-23f4db4607c4" providerId="ADAL" clId="{6DBACCA1-C247-4000-9758-17DA284A9E12}" dt="2025-09-02T08:08:36.800" v="29" actId="20578"/>
-            <ac:spMkLst>
-              <pc:docMk/>
-              <pc:sldMasterMk cId="408645214" sldId="2147483692"/>
-              <pc:sldLayoutMk cId="1806444034" sldId="2147483780"/>
-              <ac:spMk id="8" creationId="{4892DD46-7CCA-E64B-85FF-CBF1C3886095}"/>
-            </ac:spMkLst>
-          </pc:spChg>
-          <pc:spChg chg="mod">
-            <ac:chgData name="Meeaad Bharoochi" userId="5d99a4c0-c526-42b4-bcc3-23f4db4607c4" providerId="ADAL" clId="{6DBACCA1-C247-4000-9758-17DA284A9E12}" dt="2025-09-02T08:08:36.800" v="29" actId="20578"/>
-            <ac:spMkLst>
-              <pc:docMk/>
-              <pc:sldMasterMk cId="408645214" sldId="2147483692"/>
-              <pc:sldLayoutMk cId="1806444034" sldId="2147483780"/>
-              <ac:spMk id="14" creationId="{3C72FCD4-32B2-F144-B95B-61FA8242A671}"/>
-            </ac:spMkLst>
-          </pc:spChg>
         </pc:sldLayoutChg>
         <pc:sldLayoutChg chg="addSp delSp modSp mod">
           <pc:chgData name="Meeaad Bharoochi" userId="5d99a4c0-c526-42b4-bcc3-23f4db4607c4" providerId="ADAL" clId="{6DBACCA1-C247-4000-9758-17DA284A9E12}" dt="2025-09-02T07:52:51.106" v="19"/>
@@ -466,69 +234,6 @@
             <pc:sldMasterMk cId="3769149131" sldId="2147483653"/>
             <pc:sldLayoutMk cId="1887044629" sldId="2147483780"/>
           </pc:sldLayoutMkLst>
-          <pc:spChg chg="add del mod">
-            <ac:chgData name="Meeaad Bharoochi" userId="5d99a4c0-c526-42b4-bcc3-23f4db4607c4" providerId="ADAL" clId="{6DBACCA1-C247-4000-9758-17DA284A9E12}" dt="2025-09-02T07:52:50.932" v="18" actId="6549"/>
-            <ac:spMkLst>
-              <pc:docMk/>
-              <pc:sldMasterMk cId="3769149131" sldId="2147483653"/>
-              <pc:sldLayoutMk cId="1887044629" sldId="2147483780"/>
-              <ac:spMk id="2" creationId="{EC62028C-16CA-B1F4-8729-6FE615A9B7C0}"/>
-            </ac:spMkLst>
-          </pc:spChg>
-          <pc:spChg chg="add del mod">
-            <ac:chgData name="Meeaad Bharoochi" userId="5d99a4c0-c526-42b4-bcc3-23f4db4607c4" providerId="ADAL" clId="{6DBACCA1-C247-4000-9758-17DA284A9E12}" dt="2025-09-02T07:52:51.106" v="19"/>
-            <ac:spMkLst>
-              <pc:docMk/>
-              <pc:sldMasterMk cId="3769149131" sldId="2147483653"/>
-              <pc:sldLayoutMk cId="1887044629" sldId="2147483780"/>
-              <ac:spMk id="4" creationId="{1FFE8ADC-EA22-01EA-3464-DF6D6B7AD4EF}"/>
-            </ac:spMkLst>
-          </pc:spChg>
-          <pc:spChg chg="add mod">
-            <ac:chgData name="Meeaad Bharoochi" userId="5d99a4c0-c526-42b4-bcc3-23f4db4607c4" providerId="ADAL" clId="{6DBACCA1-C247-4000-9758-17DA284A9E12}" dt="2025-09-02T07:51:58.467" v="6"/>
-            <ac:spMkLst>
-              <pc:docMk/>
-              <pc:sldMasterMk cId="3769149131" sldId="2147483653"/>
-              <pc:sldLayoutMk cId="1887044629" sldId="2147483780"/>
-              <ac:spMk id="5" creationId="{600E5D3A-75E2-8C23-DFDE-4E8DD4F47B4B}"/>
-            </ac:spMkLst>
-          </pc:spChg>
-          <pc:spChg chg="add mod">
-            <ac:chgData name="Meeaad Bharoochi" userId="5d99a4c0-c526-42b4-bcc3-23f4db4607c4" providerId="ADAL" clId="{6DBACCA1-C247-4000-9758-17DA284A9E12}" dt="2025-09-02T07:52:51.106" v="19"/>
-            <ac:spMkLst>
-              <pc:docMk/>
-              <pc:sldMasterMk cId="3769149131" sldId="2147483653"/>
-              <pc:sldLayoutMk cId="1887044629" sldId="2147483780"/>
-              <ac:spMk id="7" creationId="{A465C801-187A-B631-4788-5A5F374BFF33}"/>
-            </ac:spMkLst>
-          </pc:spChg>
-          <pc:spChg chg="add mod">
-            <ac:chgData name="Meeaad Bharoochi" userId="5d99a4c0-c526-42b4-bcc3-23f4db4607c4" providerId="ADAL" clId="{6DBACCA1-C247-4000-9758-17DA284A9E12}" dt="2025-09-02T07:51:58.467" v="6"/>
-            <ac:spMkLst>
-              <pc:docMk/>
-              <pc:sldMasterMk cId="3769149131" sldId="2147483653"/>
-              <pc:sldLayoutMk cId="1887044629" sldId="2147483780"/>
-              <ac:spMk id="8" creationId="{105C7A09-763B-1010-0E98-727073B5A3EB}"/>
-            </ac:spMkLst>
-          </pc:spChg>
-          <pc:picChg chg="add mod">
-            <ac:chgData name="Meeaad Bharoochi" userId="5d99a4c0-c526-42b4-bcc3-23f4db4607c4" providerId="ADAL" clId="{6DBACCA1-C247-4000-9758-17DA284A9E12}" dt="2025-09-02T07:51:58.467" v="6"/>
-            <ac:picMkLst>
-              <pc:docMk/>
-              <pc:sldMasterMk cId="3769149131" sldId="2147483653"/>
-              <pc:sldLayoutMk cId="1887044629" sldId="2147483780"/>
-              <ac:picMk id="9" creationId="{5CF3AA8E-58D9-887C-909D-863340256624}"/>
-            </ac:picMkLst>
-          </pc:picChg>
-          <pc:cxnChg chg="add mod">
-            <ac:chgData name="Meeaad Bharoochi" userId="5d99a4c0-c526-42b4-bcc3-23f4db4607c4" providerId="ADAL" clId="{6DBACCA1-C247-4000-9758-17DA284A9E12}" dt="2025-09-02T07:51:58.467" v="6"/>
-            <ac:cxnSpMkLst>
-              <pc:docMk/>
-              <pc:sldMasterMk cId="3769149131" sldId="2147483653"/>
-              <pc:sldLayoutMk cId="1887044629" sldId="2147483780"/>
-              <ac:cxnSpMk id="6" creationId="{21D548D9-3E53-2B4E-29C7-35DFB6A3CB63}"/>
-            </ac:cxnSpMkLst>
-          </pc:cxnChg>
         </pc:sldLayoutChg>
       </pc:sldMasterChg>
       <pc:sldMasterChg chg="mod addSldLayout delSldLayout modSldLayout sldLayoutOrd">
@@ -544,42 +249,6 @@
             <pc:sldMasterMk cId="408645214" sldId="2147483692"/>
             <pc:sldLayoutMk cId="1775546100" sldId="2147483694"/>
           </pc:sldLayoutMkLst>
-          <pc:spChg chg="mod">
-            <ac:chgData name="Meeaad Bharoochi" userId="5d99a4c0-c526-42b4-bcc3-23f4db4607c4" providerId="ADAL" clId="{6DBACCA1-C247-4000-9758-17DA284A9E12}" dt="2025-09-02T08:08:31.383" v="27" actId="20578"/>
-            <ac:spMkLst>
-              <pc:docMk/>
-              <pc:sldMasterMk cId="408645214" sldId="2147483692"/>
-              <pc:sldLayoutMk cId="1775546100" sldId="2147483694"/>
-              <ac:spMk id="2" creationId="{269CF024-CE78-C044-AC1C-749F5A01162F}"/>
-            </ac:spMkLst>
-          </pc:spChg>
-          <pc:spChg chg="mod">
-            <ac:chgData name="Meeaad Bharoochi" userId="5d99a4c0-c526-42b4-bcc3-23f4db4607c4" providerId="ADAL" clId="{6DBACCA1-C247-4000-9758-17DA284A9E12}" dt="2025-09-02T08:08:31.383" v="27" actId="20578"/>
-            <ac:spMkLst>
-              <pc:docMk/>
-              <pc:sldMasterMk cId="408645214" sldId="2147483692"/>
-              <pc:sldLayoutMk cId="1775546100" sldId="2147483694"/>
-              <ac:spMk id="3" creationId="{00E98E0F-C5DC-7746-96E8-3365A74A0FB3}"/>
-            </ac:spMkLst>
-          </pc:spChg>
-          <pc:spChg chg="mod">
-            <ac:chgData name="Meeaad Bharoochi" userId="5d99a4c0-c526-42b4-bcc3-23f4db4607c4" providerId="ADAL" clId="{6DBACCA1-C247-4000-9758-17DA284A9E12}" dt="2025-09-02T08:08:31.383" v="27" actId="20578"/>
-            <ac:spMkLst>
-              <pc:docMk/>
-              <pc:sldMasterMk cId="408645214" sldId="2147483692"/>
-              <pc:sldLayoutMk cId="1775546100" sldId="2147483694"/>
-              <ac:spMk id="8" creationId="{4892DD46-7CCA-E64B-85FF-CBF1C3886095}"/>
-            </ac:spMkLst>
-          </pc:spChg>
-          <pc:spChg chg="mod">
-            <ac:chgData name="Meeaad Bharoochi" userId="5d99a4c0-c526-42b4-bcc3-23f4db4607c4" providerId="ADAL" clId="{6DBACCA1-C247-4000-9758-17DA284A9E12}" dt="2025-09-02T08:08:31.383" v="27" actId="20578"/>
-            <ac:spMkLst>
-              <pc:docMk/>
-              <pc:sldMasterMk cId="408645214" sldId="2147483692"/>
-              <pc:sldLayoutMk cId="1775546100" sldId="2147483694"/>
-              <ac:spMk id="14" creationId="{3C72FCD4-32B2-F144-B95B-61FA8242A671}"/>
-            </ac:spMkLst>
-          </pc:spChg>
         </pc:sldLayoutChg>
         <pc:sldLayoutChg chg="add del mod replId modTransition">
           <pc:chgData name="Meeaad Bharoochi" userId="5d99a4c0-c526-42b4-bcc3-23f4db4607c4" providerId="ADAL" clId="{6DBACCA1-C247-4000-9758-17DA284A9E12}" dt="2025-09-02T07:52:53.211" v="20" actId="2890"/>
@@ -596,42 +265,6 @@
             <pc:sldMasterMk cId="408645214" sldId="2147483692"/>
             <pc:sldLayoutMk cId="1806444034" sldId="2147483780"/>
           </pc:sldLayoutMkLst>
-          <pc:spChg chg="mod">
-            <ac:chgData name="Meeaad Bharoochi" userId="5d99a4c0-c526-42b4-bcc3-23f4db4607c4" providerId="ADAL" clId="{6DBACCA1-C247-4000-9758-17DA284A9E12}" dt="2025-09-02T08:11:38.496" v="32" actId="20578"/>
-            <ac:spMkLst>
-              <pc:docMk/>
-              <pc:sldMasterMk cId="408645214" sldId="2147483692"/>
-              <pc:sldLayoutMk cId="1806444034" sldId="2147483780"/>
-              <ac:spMk id="2" creationId="{269CF024-CE78-C044-AC1C-749F5A01162F}"/>
-            </ac:spMkLst>
-          </pc:spChg>
-          <pc:spChg chg="mod">
-            <ac:chgData name="Meeaad Bharoochi" userId="5d99a4c0-c526-42b4-bcc3-23f4db4607c4" providerId="ADAL" clId="{6DBACCA1-C247-4000-9758-17DA284A9E12}" dt="2025-09-02T08:11:38.496" v="32" actId="20578"/>
-            <ac:spMkLst>
-              <pc:docMk/>
-              <pc:sldMasterMk cId="408645214" sldId="2147483692"/>
-              <pc:sldLayoutMk cId="1806444034" sldId="2147483780"/>
-              <ac:spMk id="3" creationId="{00E98E0F-C5DC-7746-96E8-3365A74A0FB3}"/>
-            </ac:spMkLst>
-          </pc:spChg>
-          <pc:spChg chg="mod">
-            <ac:chgData name="Meeaad Bharoochi" userId="5d99a4c0-c526-42b4-bcc3-23f4db4607c4" providerId="ADAL" clId="{6DBACCA1-C247-4000-9758-17DA284A9E12}" dt="2025-09-02T08:11:38.496" v="32" actId="20578"/>
-            <ac:spMkLst>
-              <pc:docMk/>
-              <pc:sldMasterMk cId="408645214" sldId="2147483692"/>
-              <pc:sldLayoutMk cId="1806444034" sldId="2147483780"/>
-              <ac:spMk id="8" creationId="{4892DD46-7CCA-E64B-85FF-CBF1C3886095}"/>
-            </ac:spMkLst>
-          </pc:spChg>
-          <pc:spChg chg="mod">
-            <ac:chgData name="Meeaad Bharoochi" userId="5d99a4c0-c526-42b4-bcc3-23f4db4607c4" providerId="ADAL" clId="{6DBACCA1-C247-4000-9758-17DA284A9E12}" dt="2025-09-02T08:11:38.496" v="32" actId="20578"/>
-            <ac:spMkLst>
-              <pc:docMk/>
-              <pc:sldMasterMk cId="408645214" sldId="2147483692"/>
-              <pc:sldLayoutMk cId="1806444034" sldId="2147483780"/>
-              <ac:spMk id="14" creationId="{3C72FCD4-32B2-F144-B95B-61FA8242A671}"/>
-            </ac:spMkLst>
-          </pc:spChg>
         </pc:sldLayoutChg>
       </pc:sldMasterChg>
       <pc:sldMasterChg chg="new del mod addSldLayout delSldLayout">
@@ -826,6 +459,30 @@
       </pc:sldMasterChg>
     </pc:docChg>
   </pc:docChgLst>
+  <pc:docChgLst>
+    <pc:chgData name="Meeaad Bharoochi" userId="5d99a4c0-c526-42b4-bcc3-23f4db4607c4" providerId="ADAL" clId="{1F050E59-7ABB-4616-B145-AB565A57231F}"/>
+    <pc:docChg chg="custSel modSld">
+      <pc:chgData name="Meeaad Bharoochi" userId="5d99a4c0-c526-42b4-bcc3-23f4db4607c4" providerId="ADAL" clId="{1F050E59-7ABB-4616-B145-AB565A57231F}" dt="2025-10-22T17:38:08.800" v="0" actId="478"/>
+      <pc:docMkLst>
+        <pc:docMk/>
+      </pc:docMkLst>
+      <pc:sldChg chg="delSp mod">
+        <pc:chgData name="Meeaad Bharoochi" userId="5d99a4c0-c526-42b4-bcc3-23f4db4607c4" providerId="ADAL" clId="{1F050E59-7ABB-4616-B145-AB565A57231F}" dt="2025-10-22T17:38:08.800" v="0" actId="478"/>
+        <pc:sldMkLst>
+          <pc:docMk/>
+          <pc:sldMk cId="2493766527" sldId="828"/>
+        </pc:sldMkLst>
+        <pc:spChg chg="del">
+          <ac:chgData name="Meeaad Bharoochi" userId="5d99a4c0-c526-42b4-bcc3-23f4db4607c4" providerId="ADAL" clId="{1F050E59-7ABB-4616-B145-AB565A57231F}" dt="2025-10-22T17:38:08.800" v="0" actId="478"/>
+          <ac:spMkLst>
+            <pc:docMk/>
+            <pc:sldMk cId="2493766527" sldId="828"/>
+            <ac:spMk id="5" creationId="{C1CD49FB-F108-D29F-B8E9-3FB8B2BBCEF0}"/>
+          </ac:spMkLst>
+        </pc:spChg>
+      </pc:sldChg>
+    </pc:docChg>
+  </pc:docChgLst>
 </pc:chgInfo>
 </file>
 
@@ -927,7 +584,7 @@
               <a:rPr lang="en-GB" smtClean="0">
                 <a:latin typeface="Arial" panose="020B0604020202020204" pitchFamily="34" charset="0"/>
               </a:rPr>
-              <a:t>02/09/2025</a:t>
+              <a:t>22/10/2025</a:t>
             </a:fld>
             <a:endParaRPr lang="en-GB" dirty="0">
               <a:latin typeface="Arial" panose="020B0604020202020204" pitchFamily="34" charset="0"/>
@@ -1117,7 +774,7 @@
             <a:fld id="{40DFA392-50AE-1F47-901F-3D43EC48B69B}" type="datetimeFigureOut">
               <a:rPr lang="en-GB" smtClean="0"/>
               <a:pPr/>
-              <a:t>02/09/2025</a:t>
+              <a:t>22/10/2025</a:t>
             </a:fld>
             <a:endParaRPr lang="en-GB" dirty="0"/>
           </a:p>
@@ -5331,7 +4988,7 @@
           </a:ln>
           <a:extLst>
             <a:ext uri="{C572A759-6A51-4108-AA02-DFA0A04FC94B}">
-              <ma14:wrappingTextBoxFlag xmlns="" xmlns:ma14="http://schemas.microsoft.com/office/mac/drawingml/2011/main" val="1"/>
+              <ma14:wrappingTextBoxFlag xmlns:ma14="http://schemas.microsoft.com/office/mac/drawingml/2011/main" xmlns="" val="1"/>
             </a:ext>
           </a:extLst>
         </p:spPr>
@@ -33092,31 +32749,6 @@
           </p:cNvSpPr>
           <p:nvPr>
             <p:ph type="title"/>
-          </p:nvPr>
-        </p:nvSpPr>
-        <p:spPr/>
-        <p:txBody>
-          <a:bodyPr/>
-          <a:lstStyle/>
-          <a:p>
-            <a:endParaRPr lang="en-ZA"/>
-          </a:p>
-        </p:txBody>
-      </p:sp>
-      <p:sp>
-        <p:nvSpPr>
-          <p:cNvPr id="5" name="Content Placeholder 4">
-            <a:extLst>
-              <a:ext uri="{FF2B5EF4-FFF2-40B4-BE49-F238E27FC236}">
-                <a16:creationId xmlns:a16="http://schemas.microsoft.com/office/drawing/2014/main" id="{C1CD49FB-F108-D29F-B8E9-3FB8B2BBCEF0}"/>
-              </a:ext>
-            </a:extLst>
-          </p:cNvPr>
-          <p:cNvSpPr>
-            <a:spLocks noGrp="1"/>
-          </p:cNvSpPr>
-          <p:nvPr>
-            <p:ph idx="1"/>
           </p:nvPr>
         </p:nvSpPr>
         <p:spPr/>
@@ -35494,18 +35126,18 @@
 </file>
 
 <file path=customXml/item1.xml><?xml version="1.0" encoding="utf-8"?>
+<p:properties xmlns:p="http://schemas.microsoft.com/office/2006/metadata/properties" xmlns:xsi="http://www.w3.org/2001/XMLSchema-instance" xmlns:pc="http://schemas.microsoft.com/office/infopath/2007/PartnerControls">
+  <documentManagement/>
+</p:properties>
+</file>
+
+<file path=customXml/item2.xml><?xml version="1.0" encoding="utf-8"?>
 <?mso-contentType ?>
 <FormTemplates xmlns="http://schemas.microsoft.com/sharepoint/v3/contenttype/forms">
   <Display>DocumentLibraryForm</Display>
   <Edit>DocumentLibraryForm</Edit>
   <New>DocumentLibraryForm</New>
 </FormTemplates>
-</file>
-
-<file path=customXml/item2.xml><?xml version="1.0" encoding="utf-8"?>
-<p:properties xmlns:p="http://schemas.microsoft.com/office/2006/metadata/properties" xmlns:xsi="http://www.w3.org/2001/XMLSchema-instance" xmlns:pc="http://schemas.microsoft.com/office/infopath/2007/PartnerControls">
-  <documentManagement/>
-</p:properties>
 </file>
 
 <file path=customXml/item3.xml><?xml version="1.0" encoding="utf-8"?>
@@ -35653,14 +35285,6 @@
 </file>
 
 <file path=customXml/itemProps1.xml><?xml version="1.0" encoding="utf-8"?>
-<ds:datastoreItem xmlns:ds="http://schemas.openxmlformats.org/officeDocument/2006/customXml" ds:itemID="{43ADDD05-7DB2-4A52-8365-9553F5916038}">
-  <ds:schemaRefs>
-    <ds:schemaRef ds:uri="http://schemas.microsoft.com/sharepoint/v3/contenttype/forms"/>
-  </ds:schemaRefs>
-</ds:datastoreItem>
-</file>
-
-<file path=customXml/itemProps2.xml><?xml version="1.0" encoding="utf-8"?>
 <ds:datastoreItem xmlns:ds="http://schemas.openxmlformats.org/officeDocument/2006/customXml" ds:itemID="{9D90B691-2AAE-4477-B7ED-06759BE4504B}">
   <ds:schemaRefs>
     <ds:schemaRef ds:uri="3759d20f-f355-4101-9958-fad5ef362475"/>
@@ -35672,6 +35296,14 @@
     <ds:schemaRef ds:uri="http://schemas.microsoft.com/office/infopath/2007/PartnerControls"/>
     <ds:schemaRef ds:uri="http://purl.org/dc/dcmitype/"/>
     <ds:schemaRef ds:uri="http://schemas.openxmlformats.org/package/2006/metadata/core-properties"/>
+  </ds:schemaRefs>
+</ds:datastoreItem>
+</file>
+
+<file path=customXml/itemProps2.xml><?xml version="1.0" encoding="utf-8"?>
+<ds:datastoreItem xmlns:ds="http://schemas.openxmlformats.org/officeDocument/2006/customXml" ds:itemID="{43ADDD05-7DB2-4A52-8365-9553F5916038}">
+  <ds:schemaRefs>
+    <ds:schemaRef ds:uri="http://schemas.microsoft.com/sharepoint/v3/contenttype/forms"/>
   </ds:schemaRefs>
 </ds:datastoreItem>
 </file>

</xml_diff>